<commit_message>
Small correction to Github.pptx
</commit_message>
<xml_diff>
--- a/Slides/Github.pptx
+++ b/Slides/Github.pptx
@@ -115,7 +115,7 @@
   </p:defaultTextStyle>
   <p:extLst>
     <p:ext uri="{EFAFB233-063F-42B5-8137-9DF3F51BA10A}">
-      <p15:sldGuideLst xmlns:p15="http://schemas.microsoft.com/office/powerpoint/2012/main" xmlns="">
+      <p15:sldGuideLst xmlns="" xmlns:p15="http://schemas.microsoft.com/office/powerpoint/2012/main">
         <p15:guide id="1" orient="horz" pos="2160">
           <p15:clr>
             <a:srgbClr val="A4A3A4"/>
@@ -214,7 +214,7 @@
           <a:p>
             <a:fld id="{90AF4669-11A5-AA4B-ACB6-1CD3E71EA0D2}" type="datetimeFigureOut">
               <a:rPr lang="en-US" smtClean="0"/>
-              <a:t>4/1/14</a:t>
+              <a:t>4/3/14</a:t>
             </a:fld>
             <a:endParaRPr lang="en-US"/>
           </a:p>
@@ -758,7 +758,7 @@
           <a:p>
             <a:fld id="{C95D1B94-35C6-4950-B226-D68A01DA1DCF}" type="datetimeFigureOut">
               <a:rPr lang="en-US" smtClean="0"/>
-              <a:t>4/1/14</a:t>
+              <a:t>4/3/14</a:t>
             </a:fld>
             <a:endParaRPr lang="en-US"/>
           </a:p>
@@ -923,7 +923,7 @@
           <a:p>
             <a:fld id="{C95D1B94-35C6-4950-B226-D68A01DA1DCF}" type="datetimeFigureOut">
               <a:rPr lang="en-US" smtClean="0"/>
-              <a:t>4/1/14</a:t>
+              <a:t>4/3/14</a:t>
             </a:fld>
             <a:endParaRPr lang="en-US"/>
           </a:p>
@@ -1098,7 +1098,7 @@
           <a:p>
             <a:fld id="{C95D1B94-35C6-4950-B226-D68A01DA1DCF}" type="datetimeFigureOut">
               <a:rPr lang="en-US" smtClean="0"/>
-              <a:t>4/1/14</a:t>
+              <a:t>4/3/14</a:t>
             </a:fld>
             <a:endParaRPr lang="en-US"/>
           </a:p>
@@ -1281,7 +1281,7 @@
           <a:p>
             <a:fld id="{C95D1B94-35C6-4950-B226-D68A01DA1DCF}" type="datetimeFigureOut">
               <a:rPr lang="en-US" smtClean="0"/>
-              <a:t>4/1/14</a:t>
+              <a:t>4/3/14</a:t>
             </a:fld>
             <a:endParaRPr lang="en-US"/>
           </a:p>
@@ -1543,7 +1543,7 @@
           <a:p>
             <a:fld id="{C95D1B94-35C6-4950-B226-D68A01DA1DCF}" type="datetimeFigureOut">
               <a:rPr lang="en-US" smtClean="0"/>
-              <a:t>4/1/14</a:t>
+              <a:t>4/3/14</a:t>
             </a:fld>
             <a:endParaRPr lang="en-US"/>
           </a:p>
@@ -1891,7 +1891,7 @@
           <a:p>
             <a:fld id="{C95D1B94-35C6-4950-B226-D68A01DA1DCF}" type="datetimeFigureOut">
               <a:rPr lang="en-US" smtClean="0"/>
-              <a:t>4/1/14</a:t>
+              <a:t>4/3/14</a:t>
             </a:fld>
             <a:endParaRPr lang="en-US"/>
           </a:p>
@@ -2199,7 +2199,7 @@
           <a:p>
             <a:fld id="{C95D1B94-35C6-4950-B226-D68A01DA1DCF}" type="datetimeFigureOut">
               <a:rPr lang="en-US" smtClean="0"/>
-              <a:t>4/1/14</a:t>
+              <a:t>4/3/14</a:t>
             </a:fld>
             <a:endParaRPr lang="en-US"/>
           </a:p>
@@ -2426,7 +2426,7 @@
           <a:p>
             <a:fld id="{C95D1B94-35C6-4950-B226-D68A01DA1DCF}" type="datetimeFigureOut">
               <a:rPr lang="en-US" smtClean="0"/>
-              <a:t>4/1/14</a:t>
+              <a:t>4/3/14</a:t>
             </a:fld>
             <a:endParaRPr lang="en-US"/>
           </a:p>
@@ -2516,7 +2516,7 @@
           <a:p>
             <a:fld id="{C95D1B94-35C6-4950-B226-D68A01DA1DCF}" type="datetimeFigureOut">
               <a:rPr lang="en-US" smtClean="0"/>
-              <a:t>4/1/14</a:t>
+              <a:t>4/3/14</a:t>
             </a:fld>
             <a:endParaRPr lang="en-US"/>
           </a:p>
@@ -2804,7 +2804,7 @@
           <a:p>
             <a:fld id="{C95D1B94-35C6-4950-B226-D68A01DA1DCF}" type="datetimeFigureOut">
               <a:rPr lang="en-US" smtClean="0"/>
-              <a:t>4/1/14</a:t>
+              <a:t>4/3/14</a:t>
             </a:fld>
             <a:endParaRPr lang="en-US"/>
           </a:p>
@@ -3073,7 +3073,7 @@
           <a:p>
             <a:fld id="{C95D1B94-35C6-4950-B226-D68A01DA1DCF}" type="datetimeFigureOut">
               <a:rPr lang="en-US" smtClean="0"/>
-              <a:t>4/1/14</a:t>
+              <a:t>4/3/14</a:t>
             </a:fld>
             <a:endParaRPr lang="en-US"/>
           </a:p>
@@ -3283,7 +3283,7 @@
           <a:p>
             <a:fld id="{C95D1B94-35C6-4950-B226-D68A01DA1DCF}" type="datetimeFigureOut">
               <a:rPr lang="en-US" smtClean="0"/>
-              <a:t>4/1/14</a:t>
+              <a:t>4/3/14</a:t>
             </a:fld>
             <a:endParaRPr lang="en-US"/>
           </a:p>
@@ -3944,7 +3944,6 @@
               <a:rPr lang="en-US" dirty="0" smtClean="0"/>
               <a:t>It makes working on changes and then incorporating those changes easy</a:t>
             </a:r>
-            <a:endParaRPr lang="en-US" dirty="0" smtClean="0"/>
           </a:p>
           <a:p>
             <a:pPr lvl="1"/>
@@ -6053,7 +6052,7 @@
             <a:pPr lvl="1"/>
             <a:r>
               <a:rPr lang="en-US" dirty="0" smtClean="0"/>
-              <a:t>Open a repository in the </a:t>
+              <a:t>In the list of local repositories on </a:t>
             </a:r>
             <a:r>
               <a:rPr lang="en-US" dirty="0" err="1" smtClean="0"/>
@@ -6061,105 +6060,79 @@
             </a:r>
             <a:r>
               <a:rPr lang="en-US" dirty="0" smtClean="0"/>
-              <a:t> app, (the view with commits on the left)</a:t>
-            </a:r>
+              <a:t>, right-click the repo you want to fix</a:t>
+            </a:r>
+            <a:endParaRPr lang="en-US" dirty="0" smtClean="0"/>
           </a:p>
           <a:p>
             <a:pPr lvl="1"/>
             <a:r>
               <a:rPr lang="en-US" dirty="0" smtClean="0"/>
-              <a:t>Click the gear in the top right, select “repository settings”</a:t>
-            </a:r>
+              <a:t>Click “Open a shell here”</a:t>
+            </a:r>
+            <a:endParaRPr lang="en-US" dirty="0" smtClean="0"/>
           </a:p>
           <a:p>
             <a:pPr lvl="1"/>
             <a:r>
               <a:rPr lang="en-US" dirty="0" smtClean="0"/>
-              <a:t>Change “Primary Remote” to the URL of your repository on </a:t>
+              <a:t>Type the following, to change where </a:t>
             </a:r>
             <a:r>
               <a:rPr lang="en-US" dirty="0" err="1" smtClean="0"/>
               <a:t>Github</a:t>
             </a:r>
+            <a:r>
+              <a:rPr lang="en-US" dirty="0" smtClean="0"/>
+              <a:t> will try to sync your fork:</a:t>
+            </a:r>
             <a:endParaRPr lang="en-US" dirty="0" smtClean="0"/>
           </a:p>
           <a:p>
-            <a:pPr lvl="2"/>
+            <a:pPr lvl="1"/>
+            <a:r>
+              <a:rPr lang="en-US" b="1" dirty="0" err="1" smtClean="0"/>
+              <a:t>git</a:t>
+            </a:r>
+            <a:r>
+              <a:rPr lang="en-US" b="1" dirty="0" smtClean="0"/>
+              <a:t> </a:t>
+            </a:r>
+            <a:r>
+              <a:rPr lang="en-US" b="1" dirty="0"/>
+              <a:t>remote set-</a:t>
+            </a:r>
+            <a:r>
+              <a:rPr lang="en-US" b="1" dirty="0" err="1"/>
+              <a:t>url</a:t>
+            </a:r>
+            <a:r>
+              <a:rPr lang="en-US" b="1" dirty="0"/>
+              <a:t> origin https://</a:t>
+            </a:r>
+            <a:r>
+              <a:rPr lang="en-US" b="1" dirty="0" err="1"/>
+              <a:t>github.com</a:t>
+            </a:r>
+            <a:r>
+              <a:rPr lang="en-US" b="1" dirty="0" smtClean="0"/>
+              <a:t>/&lt;username&gt;/Homework1.git</a:t>
+            </a:r>
+            <a:endParaRPr lang="en-US" b="1" dirty="0" smtClean="0"/>
+          </a:p>
+          <a:p>
+            <a:pPr lvl="1"/>
             <a:r>
               <a:rPr lang="en-US" dirty="0" smtClean="0"/>
-              <a:t>Just change “EE590-Spring2014” to your username, for example:</a:t>
-            </a:r>
-          </a:p>
-          <a:p>
-            <a:pPr lvl="2"/>
+              <a:t>This will set your local repositories’ “origin” to the URL of your fork</a:t>
+            </a:r>
+          </a:p>
+          <a:p>
+            <a:pPr lvl="1"/>
             <a:r>
               <a:rPr lang="en-US" dirty="0" smtClean="0"/>
-              <a:t>Old:   </a:t>
-            </a:r>
-            <a:r>
-              <a:rPr lang="en-US" dirty="0" smtClean="0">
-                <a:hlinkClick r:id="rId2"/>
-              </a:rPr>
-              <a:t>https</a:t>
-            </a:r>
-            <a:r>
-              <a:rPr lang="en-US" dirty="0">
-                <a:hlinkClick r:id="rId2"/>
-              </a:rPr>
-              <a:t>://github.com/EE590-Spring2014/Homework1.</a:t>
-            </a:r>
-            <a:r>
-              <a:rPr lang="en-US" dirty="0" smtClean="0">
-                <a:hlinkClick r:id="rId2"/>
-              </a:rPr>
-              <a:t>git</a:t>
-            </a:r>
-            <a:endParaRPr lang="en-US" dirty="0" smtClean="0"/>
-          </a:p>
-          <a:p>
-            <a:pPr lvl="2"/>
-            <a:r>
-              <a:rPr lang="en-US" dirty="0" smtClean="0"/>
-              <a:t>New: </a:t>
-            </a:r>
-            <a:r>
-              <a:rPr lang="en-US" dirty="0" smtClean="0">
-                <a:hlinkClick r:id="rId3"/>
-              </a:rPr>
-              <a:t>https</a:t>
-            </a:r>
-            <a:r>
-              <a:rPr lang="en-US" dirty="0">
-                <a:hlinkClick r:id="rId3"/>
-              </a:rPr>
-              <a:t>://github.com</a:t>
-            </a:r>
-            <a:r>
-              <a:rPr lang="en-US" dirty="0" smtClean="0">
-                <a:hlinkClick r:id="rId3"/>
-              </a:rPr>
-              <a:t>/staticfloat/</a:t>
-            </a:r>
-            <a:r>
-              <a:rPr lang="en-US" dirty="0">
-                <a:hlinkClick r:id="rId3"/>
-              </a:rPr>
-              <a:t>Homework1.</a:t>
-            </a:r>
-            <a:r>
-              <a:rPr lang="en-US" dirty="0" smtClean="0">
-                <a:hlinkClick r:id="rId3"/>
-              </a:rPr>
-              <a:t>git</a:t>
-            </a:r>
-            <a:endParaRPr lang="en-US" dirty="0" smtClean="0"/>
-          </a:p>
-          <a:p>
-            <a:pPr lvl="2"/>
-            <a:endParaRPr lang="en-US" dirty="0" smtClean="0"/>
-          </a:p>
-          <a:p>
-            <a:pPr lvl="1"/>
+              <a:t>After this, a sync will push your changes to your fork.</a:t>
+            </a:r>
             <a:endParaRPr lang="en-US" dirty="0"/>
           </a:p>
         </p:txBody>

</xml_diff>